<commit_message>
Added Images wich display a stone transition
</commit_message>
<xml_diff>
--- a/src/othello/images/Presentation for creating more transition images.pptx
+++ b/src/othello/images/Presentation for creating more transition images.pptx
@@ -148,13 +148,120 @@
 <file path=ppt/revisionInfo.xml><?xml version="1.0" encoding="utf-8"?>
 <p1510:revInfo xmlns:a="http://schemas.openxmlformats.org/drawingml/2006/main" xmlns:r="http://schemas.openxmlformats.org/officeDocument/2006/relationships" xmlns:p1510="http://schemas.microsoft.com/office/powerpoint/2015/10/main">
   <p1510:revLst>
-    <p1510:client id="{A822A23D-D6B0-4E85-B2E7-2ADABC0427C9}" v="2" dt="2024-11-20T16:40:34.359"/>
+    <p1510:client id="{E400C255-5131-45E2-A177-C6B633033A6C}" v="231" dt="2024-12-21T12:05:49.702"/>
   </p1510:revLst>
 </p1510:revInfo>
 </file>
 
 <file path=ppt/changesInfos/changesInfo1.xml><?xml version="1.0" encoding="utf-8"?>
 <pc:chgInfo xmlns:a="http://schemas.openxmlformats.org/drawingml/2006/main" xmlns:r="http://schemas.openxmlformats.org/officeDocument/2006/relationships" xmlns:ac="http://schemas.microsoft.com/office/drawing/2013/main/command" xmlns:pc="http://schemas.microsoft.com/office/powerpoint/2013/main/command">
+  <pc:docChgLst>
+    <pc:chgData name="Junghans Leo" userId="c1dee5e2-0134-426e-a745-def32087026c" providerId="ADAL" clId="{E400C255-5131-45E2-A177-C6B633033A6C}"/>
+    <pc:docChg chg="modSld">
+      <pc:chgData name="Junghans Leo" userId="c1dee5e2-0134-426e-a745-def32087026c" providerId="ADAL" clId="{E400C255-5131-45E2-A177-C6B633033A6C}" dt="2024-12-21T12:05:48.459" v="216"/>
+      <pc:docMkLst>
+        <pc:docMk/>
+      </pc:docMkLst>
+      <pc:sldChg chg="setBg">
+        <pc:chgData name="Junghans Leo" userId="c1dee5e2-0134-426e-a745-def32087026c" providerId="ADAL" clId="{E400C255-5131-45E2-A177-C6B633033A6C}" dt="2024-12-21T11:54:15.068" v="34"/>
+        <pc:sldMkLst>
+          <pc:docMk/>
+          <pc:sldMk cId="2054924457" sldId="262"/>
+        </pc:sldMkLst>
+      </pc:sldChg>
+      <pc:sldChg chg="setBg">
+        <pc:chgData name="Junghans Leo" userId="c1dee5e2-0134-426e-a745-def32087026c" providerId="ADAL" clId="{E400C255-5131-45E2-A177-C6B633033A6C}" dt="2024-12-21T11:59:28.419" v="43"/>
+        <pc:sldMkLst>
+          <pc:docMk/>
+          <pc:sldMk cId="3601723593" sldId="263"/>
+        </pc:sldMkLst>
+      </pc:sldChg>
+      <pc:sldChg chg="setBg">
+        <pc:chgData name="Junghans Leo" userId="c1dee5e2-0134-426e-a745-def32087026c" providerId="ADAL" clId="{E400C255-5131-45E2-A177-C6B633033A6C}" dt="2024-12-21T12:01:07.276" v="82"/>
+        <pc:sldMkLst>
+          <pc:docMk/>
+          <pc:sldMk cId="1255610783" sldId="264"/>
+        </pc:sldMkLst>
+      </pc:sldChg>
+      <pc:sldChg chg="setBg">
+        <pc:chgData name="Junghans Leo" userId="c1dee5e2-0134-426e-a745-def32087026c" providerId="ADAL" clId="{E400C255-5131-45E2-A177-C6B633033A6C}" dt="2024-12-21T12:00:20.217" v="55"/>
+        <pc:sldMkLst>
+          <pc:docMk/>
+          <pc:sldMk cId="3310265819" sldId="265"/>
+        </pc:sldMkLst>
+      </pc:sldChg>
+      <pc:sldChg chg="setBg">
+        <pc:chgData name="Junghans Leo" userId="c1dee5e2-0134-426e-a745-def32087026c" providerId="ADAL" clId="{E400C255-5131-45E2-A177-C6B633033A6C}" dt="2024-12-21T12:01:36.717" v="99"/>
+        <pc:sldMkLst>
+          <pc:docMk/>
+          <pc:sldMk cId="4225560282" sldId="266"/>
+        </pc:sldMkLst>
+      </pc:sldChg>
+      <pc:sldChg chg="setBg">
+        <pc:chgData name="Junghans Leo" userId="c1dee5e2-0134-426e-a745-def32087026c" providerId="ADAL" clId="{E400C255-5131-45E2-A177-C6B633033A6C}" dt="2024-12-21T12:02:15.094" v="105"/>
+        <pc:sldMkLst>
+          <pc:docMk/>
+          <pc:sldMk cId="4022941851" sldId="268"/>
+        </pc:sldMkLst>
+      </pc:sldChg>
+      <pc:sldChg chg="setBg">
+        <pc:chgData name="Junghans Leo" userId="c1dee5e2-0134-426e-a745-def32087026c" providerId="ADAL" clId="{E400C255-5131-45E2-A177-C6B633033A6C}" dt="2024-12-21T12:02:41.693" v="111"/>
+        <pc:sldMkLst>
+          <pc:docMk/>
+          <pc:sldMk cId="2634611062" sldId="269"/>
+        </pc:sldMkLst>
+      </pc:sldChg>
+      <pc:sldChg chg="setBg">
+        <pc:chgData name="Junghans Leo" userId="c1dee5e2-0134-426e-a745-def32087026c" providerId="ADAL" clId="{E400C255-5131-45E2-A177-C6B633033A6C}" dt="2024-12-21T12:03:07.392" v="118"/>
+        <pc:sldMkLst>
+          <pc:docMk/>
+          <pc:sldMk cId="2864788576" sldId="270"/>
+        </pc:sldMkLst>
+      </pc:sldChg>
+      <pc:sldChg chg="setBg">
+        <pc:chgData name="Junghans Leo" userId="c1dee5e2-0134-426e-a745-def32087026c" providerId="ADAL" clId="{E400C255-5131-45E2-A177-C6B633033A6C}" dt="2024-12-21T12:03:38.044" v="135"/>
+        <pc:sldMkLst>
+          <pc:docMk/>
+          <pc:sldMk cId="1936844617" sldId="272"/>
+        </pc:sldMkLst>
+      </pc:sldChg>
+      <pc:sldChg chg="setBg">
+        <pc:chgData name="Junghans Leo" userId="c1dee5e2-0134-426e-a745-def32087026c" providerId="ADAL" clId="{E400C255-5131-45E2-A177-C6B633033A6C}" dt="2024-12-21T12:04:29.276" v="183"/>
+        <pc:sldMkLst>
+          <pc:docMk/>
+          <pc:sldMk cId="1807577605" sldId="273"/>
+        </pc:sldMkLst>
+      </pc:sldChg>
+      <pc:sldChg chg="setBg">
+        <pc:chgData name="Junghans Leo" userId="c1dee5e2-0134-426e-a745-def32087026c" providerId="ADAL" clId="{E400C255-5131-45E2-A177-C6B633033A6C}" dt="2024-12-21T12:04:01.511" v="158"/>
+        <pc:sldMkLst>
+          <pc:docMk/>
+          <pc:sldMk cId="2674854929" sldId="274"/>
+        </pc:sldMkLst>
+      </pc:sldChg>
+      <pc:sldChg chg="setBg">
+        <pc:chgData name="Junghans Leo" userId="c1dee5e2-0134-426e-a745-def32087026c" providerId="ADAL" clId="{E400C255-5131-45E2-A177-C6B633033A6C}" dt="2024-12-21T12:04:53.020" v="205"/>
+        <pc:sldMkLst>
+          <pc:docMk/>
+          <pc:sldMk cId="1308820494" sldId="275"/>
+        </pc:sldMkLst>
+      </pc:sldChg>
+      <pc:sldChg chg="setBg">
+        <pc:chgData name="Junghans Leo" userId="c1dee5e2-0134-426e-a745-def32087026c" providerId="ADAL" clId="{E400C255-5131-45E2-A177-C6B633033A6C}" dt="2024-12-21T12:05:16.359" v="212"/>
+        <pc:sldMkLst>
+          <pc:docMk/>
+          <pc:sldMk cId="1547772822" sldId="276"/>
+        </pc:sldMkLst>
+      </pc:sldChg>
+      <pc:sldChg chg="setBg">
+        <pc:chgData name="Junghans Leo" userId="c1dee5e2-0134-426e-a745-def32087026c" providerId="ADAL" clId="{E400C255-5131-45E2-A177-C6B633033A6C}" dt="2024-12-21T12:05:48.459" v="216"/>
+        <pc:sldMkLst>
+          <pc:docMk/>
+          <pc:sldMk cId="557029492" sldId="277"/>
+        </pc:sldMkLst>
+      </pc:sldChg>
+    </pc:docChg>
+  </pc:docChgLst>
   <pc:docChgLst>
     <pc:chgData name="Junghans Leo" userId="c1dee5e2-0134-426e-a745-def32087026c" providerId="ADAL" clId="{A822A23D-D6B0-4E85-B2E7-2ADABC0427C9}"/>
     <pc:docChg chg="undo custSel addSld delSld modSld sldOrd">
@@ -428,22 +535,6 @@
           <pc:docMk/>
           <pc:sldMk cId="2059466877" sldId="278"/>
         </pc:sldMkLst>
-        <pc:spChg chg="add del mod">
-          <ac:chgData name="Junghans Leo" userId="c1dee5e2-0134-426e-a745-def32087026c" providerId="ADAL" clId="{A822A23D-D6B0-4E85-B2E7-2ADABC0427C9}" dt="2024-11-20T16:26:49.537" v="543" actId="478"/>
-          <ac:spMkLst>
-            <pc:docMk/>
-            <pc:sldMk cId="2059466877" sldId="278"/>
-            <ac:spMk id="4" creationId="{88F43211-32B8-2FD2-B83A-6E587B167AE9}"/>
-          </ac:spMkLst>
-        </pc:spChg>
-        <pc:spChg chg="del">
-          <ac:chgData name="Junghans Leo" userId="c1dee5e2-0134-426e-a745-def32087026c" providerId="ADAL" clId="{A822A23D-D6B0-4E85-B2E7-2ADABC0427C9}" dt="2024-11-20T16:26:51.013" v="544" actId="478"/>
-          <ac:spMkLst>
-            <pc:docMk/>
-            <pc:sldMk cId="2059466877" sldId="278"/>
-            <ac:spMk id="8" creationId="{95D3F3DB-54C6-866C-0EC1-ABABE7968B9D}"/>
-          </ac:spMkLst>
-        </pc:spChg>
         <pc:spChg chg="add mod">
           <ac:chgData name="Junghans Leo" userId="c1dee5e2-0134-426e-a745-def32087026c" providerId="ADAL" clId="{A822A23D-D6B0-4E85-B2E7-2ADABC0427C9}" dt="2024-11-20T16:28:38.719" v="557" actId="207"/>
           <ac:spMkLst>
@@ -452,28 +543,12 @@
             <ac:spMk id="12" creationId="{DD3A7B03-AD7C-33A1-7D17-38F5E761D41F}"/>
           </ac:spMkLst>
         </pc:spChg>
-        <pc:picChg chg="del">
-          <ac:chgData name="Junghans Leo" userId="c1dee5e2-0134-426e-a745-def32087026c" providerId="ADAL" clId="{A822A23D-D6B0-4E85-B2E7-2ADABC0427C9}" dt="2024-11-20T16:26:43.976" v="540" actId="478"/>
-          <ac:picMkLst>
-            <pc:docMk/>
-            <pc:sldMk cId="2059466877" sldId="278"/>
-            <ac:picMk id="5" creationId="{3AE93BC4-5863-C1F9-4CDF-2B0219411821}"/>
-          </ac:picMkLst>
-        </pc:picChg>
         <pc:picChg chg="add mod ord modCrop">
           <ac:chgData name="Junghans Leo" userId="c1dee5e2-0134-426e-a745-def32087026c" providerId="ADAL" clId="{A822A23D-D6B0-4E85-B2E7-2ADABC0427C9}" dt="2024-11-20T16:31:03.477" v="755" actId="1076"/>
           <ac:picMkLst>
             <pc:docMk/>
             <pc:sldMk cId="2059466877" sldId="278"/>
             <ac:picMk id="7" creationId="{5FDDC30B-676D-E3DD-52C3-F2779B579F77}"/>
-          </ac:picMkLst>
-        </pc:picChg>
-        <pc:picChg chg="del">
-          <ac:chgData name="Junghans Leo" userId="c1dee5e2-0134-426e-a745-def32087026c" providerId="ADAL" clId="{A822A23D-D6B0-4E85-B2E7-2ADABC0427C9}" dt="2024-11-20T16:26:42.539" v="539" actId="478"/>
-          <ac:picMkLst>
-            <pc:docMk/>
-            <pc:sldMk cId="2059466877" sldId="278"/>
-            <ac:picMk id="9" creationId="{A9E09110-608F-7AE1-9511-521CE637E169}"/>
           </ac:picMkLst>
         </pc:picChg>
         <pc:picChg chg="add mod">
@@ -641,14 +716,6 @@
           <pc:docMk/>
           <pc:sldMk cId="1284763942" sldId="289"/>
         </pc:sldMkLst>
-        <pc:picChg chg="mod modCrop">
-          <ac:chgData name="Junghans Leo" userId="c1dee5e2-0134-426e-a745-def32087026c" providerId="ADAL" clId="{A822A23D-D6B0-4E85-B2E7-2ADABC0427C9}" dt="2024-11-20T16:35:02.722" v="986" actId="1076"/>
-          <ac:picMkLst>
-            <pc:docMk/>
-            <pc:sldMk cId="1284763942" sldId="289"/>
-            <ac:picMk id="7" creationId="{B123FAB4-4FFC-7721-F7A4-4431F3B8D13F}"/>
-          </ac:picMkLst>
-        </pc:picChg>
       </pc:sldChg>
       <pc:sldChg chg="modSp add mod">
         <pc:chgData name="Junghans Leo" userId="c1dee5e2-0134-426e-a745-def32087026c" providerId="ADAL" clId="{A822A23D-D6B0-4E85-B2E7-2ADABC0427C9}" dt="2024-11-20T16:35:42.179" v="1008" actId="1076"/>
@@ -701,14 +768,6 @@
           <pc:docMk/>
           <pc:sldMk cId="887462264" sldId="293"/>
         </pc:sldMkLst>
-        <pc:picChg chg="add del mod">
-          <ac:chgData name="Junghans Leo" userId="c1dee5e2-0134-426e-a745-def32087026c" providerId="ADAL" clId="{A822A23D-D6B0-4E85-B2E7-2ADABC0427C9}" dt="2024-11-20T16:42:49.390" v="1146" actId="478"/>
-          <ac:picMkLst>
-            <pc:docMk/>
-            <pc:sldMk cId="887462264" sldId="293"/>
-            <ac:picMk id="3" creationId="{7A7C3217-C5A1-96B5-BC1F-2AE92484BF42}"/>
-          </ac:picMkLst>
-        </pc:picChg>
         <pc:picChg chg="mod modCrop">
           <ac:chgData name="Junghans Leo" userId="c1dee5e2-0134-426e-a745-def32087026c" providerId="ADAL" clId="{A822A23D-D6B0-4E85-B2E7-2ADABC0427C9}" dt="2024-11-20T16:41:14.081" v="1144" actId="1076"/>
           <ac:picMkLst>
@@ -901,7 +960,7 @@
           <a:p>
             <a:fld id="{3E127622-CA30-493B-A7E7-4BC458541F44}" type="datetimeFigureOut">
               <a:rPr lang="LID4096" smtClean="0"/>
-              <a:t>11/20/2024</a:t>
+              <a:t>12/21/2024</a:t>
             </a:fld>
             <a:endParaRPr lang="LID4096"/>
           </a:p>
@@ -1101,7 +1160,7 @@
           <a:p>
             <a:fld id="{3E127622-CA30-493B-A7E7-4BC458541F44}" type="datetimeFigureOut">
               <a:rPr lang="LID4096" smtClean="0"/>
-              <a:t>11/20/2024</a:t>
+              <a:t>12/21/2024</a:t>
             </a:fld>
             <a:endParaRPr lang="LID4096"/>
           </a:p>
@@ -1311,7 +1370,7 @@
           <a:p>
             <a:fld id="{3E127622-CA30-493B-A7E7-4BC458541F44}" type="datetimeFigureOut">
               <a:rPr lang="LID4096" smtClean="0"/>
-              <a:t>11/20/2024</a:t>
+              <a:t>12/21/2024</a:t>
             </a:fld>
             <a:endParaRPr lang="LID4096"/>
           </a:p>
@@ -1511,7 +1570,7 @@
           <a:p>
             <a:fld id="{3E127622-CA30-493B-A7E7-4BC458541F44}" type="datetimeFigureOut">
               <a:rPr lang="LID4096" smtClean="0"/>
-              <a:t>11/20/2024</a:t>
+              <a:t>12/21/2024</a:t>
             </a:fld>
             <a:endParaRPr lang="LID4096"/>
           </a:p>
@@ -1787,7 +1846,7 @@
           <a:p>
             <a:fld id="{3E127622-CA30-493B-A7E7-4BC458541F44}" type="datetimeFigureOut">
               <a:rPr lang="LID4096" smtClean="0"/>
-              <a:t>11/20/2024</a:t>
+              <a:t>12/21/2024</a:t>
             </a:fld>
             <a:endParaRPr lang="LID4096"/>
           </a:p>
@@ -2055,7 +2114,7 @@
           <a:p>
             <a:fld id="{3E127622-CA30-493B-A7E7-4BC458541F44}" type="datetimeFigureOut">
               <a:rPr lang="LID4096" smtClean="0"/>
-              <a:t>11/20/2024</a:t>
+              <a:t>12/21/2024</a:t>
             </a:fld>
             <a:endParaRPr lang="LID4096"/>
           </a:p>
@@ -2470,7 +2529,7 @@
           <a:p>
             <a:fld id="{3E127622-CA30-493B-A7E7-4BC458541F44}" type="datetimeFigureOut">
               <a:rPr lang="LID4096" smtClean="0"/>
-              <a:t>11/20/2024</a:t>
+              <a:t>12/21/2024</a:t>
             </a:fld>
             <a:endParaRPr lang="LID4096"/>
           </a:p>
@@ -2612,7 +2671,7 @@
           <a:p>
             <a:fld id="{3E127622-CA30-493B-A7E7-4BC458541F44}" type="datetimeFigureOut">
               <a:rPr lang="LID4096" smtClean="0"/>
-              <a:t>11/20/2024</a:t>
+              <a:t>12/21/2024</a:t>
             </a:fld>
             <a:endParaRPr lang="LID4096"/>
           </a:p>
@@ -2725,7 +2784,7 @@
           <a:p>
             <a:fld id="{3E127622-CA30-493B-A7E7-4BC458541F44}" type="datetimeFigureOut">
               <a:rPr lang="LID4096" smtClean="0"/>
-              <a:t>11/20/2024</a:t>
+              <a:t>12/21/2024</a:t>
             </a:fld>
             <a:endParaRPr lang="LID4096"/>
           </a:p>
@@ -3038,7 +3097,7 @@
           <a:p>
             <a:fld id="{3E127622-CA30-493B-A7E7-4BC458541F44}" type="datetimeFigureOut">
               <a:rPr lang="LID4096" smtClean="0"/>
-              <a:t>11/20/2024</a:t>
+              <a:t>12/21/2024</a:t>
             </a:fld>
             <a:endParaRPr lang="LID4096"/>
           </a:p>
@@ -3327,7 +3386,7 @@
           <a:p>
             <a:fld id="{3E127622-CA30-493B-A7E7-4BC458541F44}" type="datetimeFigureOut">
               <a:rPr lang="LID4096" smtClean="0"/>
-              <a:t>11/20/2024</a:t>
+              <a:t>12/21/2024</a:t>
             </a:fld>
             <a:endParaRPr lang="LID4096"/>
           </a:p>
@@ -3570,7 +3629,7 @@
           <a:p>
             <a:fld id="{3E127622-CA30-493B-A7E7-4BC458541F44}" type="datetimeFigureOut">
               <a:rPr lang="LID4096" smtClean="0"/>
-              <a:t>11/20/2024</a:t>
+              <a:t>12/21/2024</a:t>
             </a:fld>
             <a:endParaRPr lang="LID4096"/>
           </a:p>
@@ -4055,8 +4114,18 @@
 </file>
 
 <file path=ppt/slides/slide10.xml><?xml version="1.0" encoding="utf-8"?>
-<p:sld xmlns:a="http://schemas.openxmlformats.org/drawingml/2006/main" xmlns:r="http://schemas.openxmlformats.org/officeDocument/2006/relationships" xmlns:p="http://schemas.openxmlformats.org/presentationml/2006/main">
+<p:sld xmlns:a="http://schemas.openxmlformats.org/drawingml/2006/main" xmlns:r="http://schemas.openxmlformats.org/officeDocument/2006/relationships" xmlns:p="http://schemas.openxmlformats.org/presentationml/2006/main" showMasterSp="0">
   <p:cSld>
+    <p:bg>
+      <p:bgPr>
+        <a:solidFill>
+          <a:schemeClr val="bg1">
+            <a:alpha val="0"/>
+          </a:schemeClr>
+        </a:solidFill>
+        <a:effectLst/>
+      </p:bgPr>
+    </p:bg>
     <p:spTree>
       <p:nvGrpSpPr>
         <p:cNvPr id="1" name="">
@@ -4233,8 +4302,18 @@
 </file>
 
 <file path=ppt/slides/slide11.xml><?xml version="1.0" encoding="utf-8"?>
-<p:sld xmlns:a="http://schemas.openxmlformats.org/drawingml/2006/main" xmlns:r="http://schemas.openxmlformats.org/officeDocument/2006/relationships" xmlns:p="http://schemas.openxmlformats.org/presentationml/2006/main">
+<p:sld xmlns:a="http://schemas.openxmlformats.org/drawingml/2006/main" xmlns:r="http://schemas.openxmlformats.org/officeDocument/2006/relationships" xmlns:p="http://schemas.openxmlformats.org/presentationml/2006/main" showMasterSp="0">
   <p:cSld>
+    <p:bg>
+      <p:bgPr>
+        <a:solidFill>
+          <a:schemeClr val="bg1">
+            <a:alpha val="0"/>
+          </a:schemeClr>
+        </a:solidFill>
+        <a:effectLst/>
+      </p:bgPr>
+    </p:bg>
     <p:spTree>
       <p:nvGrpSpPr>
         <p:cNvPr id="1" name="">
@@ -4589,8 +4668,18 @@
 </file>
 
 <file path=ppt/slides/slide13.xml><?xml version="1.0" encoding="utf-8"?>
-<p:sld xmlns:a="http://schemas.openxmlformats.org/drawingml/2006/main" xmlns:r="http://schemas.openxmlformats.org/officeDocument/2006/relationships" xmlns:p="http://schemas.openxmlformats.org/presentationml/2006/main">
+<p:sld xmlns:a="http://schemas.openxmlformats.org/drawingml/2006/main" xmlns:r="http://schemas.openxmlformats.org/officeDocument/2006/relationships" xmlns:p="http://schemas.openxmlformats.org/presentationml/2006/main" showMasterSp="0">
   <p:cSld>
+    <p:bg>
+      <p:bgPr>
+        <a:solidFill>
+          <a:schemeClr val="bg1">
+            <a:alpha val="0"/>
+          </a:schemeClr>
+        </a:solidFill>
+        <a:effectLst/>
+      </p:bgPr>
+    </p:bg>
     <p:spTree>
       <p:nvGrpSpPr>
         <p:cNvPr id="1" name="">
@@ -4767,8 +4856,18 @@
 </file>
 
 <file path=ppt/slides/slide14.xml><?xml version="1.0" encoding="utf-8"?>
-<p:sld xmlns:a="http://schemas.openxmlformats.org/drawingml/2006/main" xmlns:r="http://schemas.openxmlformats.org/officeDocument/2006/relationships" xmlns:p="http://schemas.openxmlformats.org/presentationml/2006/main">
+<p:sld xmlns:a="http://schemas.openxmlformats.org/drawingml/2006/main" xmlns:r="http://schemas.openxmlformats.org/officeDocument/2006/relationships" xmlns:p="http://schemas.openxmlformats.org/presentationml/2006/main" showMasterSp="0">
   <p:cSld>
+    <p:bg>
+      <p:bgPr>
+        <a:solidFill>
+          <a:schemeClr val="bg1">
+            <a:alpha val="0"/>
+          </a:schemeClr>
+        </a:solidFill>
+        <a:effectLst/>
+      </p:bgPr>
+    </p:bg>
     <p:spTree>
       <p:nvGrpSpPr>
         <p:cNvPr id="1" name="">
@@ -4945,8 +5044,18 @@
 </file>
 
 <file path=ppt/slides/slide15.xml><?xml version="1.0" encoding="utf-8"?>
-<p:sld xmlns:a="http://schemas.openxmlformats.org/drawingml/2006/main" xmlns:r="http://schemas.openxmlformats.org/officeDocument/2006/relationships" xmlns:p="http://schemas.openxmlformats.org/presentationml/2006/main">
+<p:sld xmlns:a="http://schemas.openxmlformats.org/drawingml/2006/main" xmlns:r="http://schemas.openxmlformats.org/officeDocument/2006/relationships" xmlns:p="http://schemas.openxmlformats.org/presentationml/2006/main" showMasterSp="0">
   <p:cSld>
+    <p:bg>
+      <p:bgPr>
+        <a:solidFill>
+          <a:schemeClr val="bg1">
+            <a:alpha val="0"/>
+          </a:schemeClr>
+        </a:solidFill>
+        <a:effectLst/>
+      </p:bgPr>
+    </p:bg>
     <p:spTree>
       <p:nvGrpSpPr>
         <p:cNvPr id="1" name="">
@@ -5123,8 +5232,18 @@
 </file>
 
 <file path=ppt/slides/slide16.xml><?xml version="1.0" encoding="utf-8"?>
-<p:sld xmlns:a="http://schemas.openxmlformats.org/drawingml/2006/main" xmlns:r="http://schemas.openxmlformats.org/officeDocument/2006/relationships" xmlns:p="http://schemas.openxmlformats.org/presentationml/2006/main">
+<p:sld xmlns:a="http://schemas.openxmlformats.org/drawingml/2006/main" xmlns:r="http://schemas.openxmlformats.org/officeDocument/2006/relationships" xmlns:p="http://schemas.openxmlformats.org/presentationml/2006/main" showMasterSp="0">
   <p:cSld>
+    <p:bg>
+      <p:bgPr>
+        <a:solidFill>
+          <a:schemeClr val="bg1">
+            <a:alpha val="0"/>
+          </a:schemeClr>
+        </a:solidFill>
+        <a:effectLst/>
+      </p:bgPr>
+    </p:bg>
     <p:spTree>
       <p:nvGrpSpPr>
         <p:cNvPr id="1" name="">
@@ -5301,8 +5420,18 @@
 </file>
 
 <file path=ppt/slides/slide17.xml><?xml version="1.0" encoding="utf-8"?>
-<p:sld xmlns:a="http://schemas.openxmlformats.org/drawingml/2006/main" xmlns:r="http://schemas.openxmlformats.org/officeDocument/2006/relationships" xmlns:p="http://schemas.openxmlformats.org/presentationml/2006/main">
+<p:sld xmlns:a="http://schemas.openxmlformats.org/drawingml/2006/main" xmlns:r="http://schemas.openxmlformats.org/officeDocument/2006/relationships" xmlns:p="http://schemas.openxmlformats.org/presentationml/2006/main" showMasterSp="0">
   <p:cSld>
+    <p:bg>
+      <p:bgPr>
+        <a:solidFill>
+          <a:schemeClr val="bg1">
+            <a:alpha val="0"/>
+          </a:schemeClr>
+        </a:solidFill>
+        <a:effectLst/>
+      </p:bgPr>
+    </p:bg>
     <p:spTree>
       <p:nvGrpSpPr>
         <p:cNvPr id="1" name="">
@@ -5479,8 +5608,18 @@
 </file>
 
 <file path=ppt/slides/slide18.xml><?xml version="1.0" encoding="utf-8"?>
-<p:sld xmlns:a="http://schemas.openxmlformats.org/drawingml/2006/main" xmlns:r="http://schemas.openxmlformats.org/officeDocument/2006/relationships" xmlns:p="http://schemas.openxmlformats.org/presentationml/2006/main">
+<p:sld xmlns:a="http://schemas.openxmlformats.org/drawingml/2006/main" xmlns:r="http://schemas.openxmlformats.org/officeDocument/2006/relationships" xmlns:p="http://schemas.openxmlformats.org/presentationml/2006/main" showMasterSp="0">
   <p:cSld>
+    <p:bg>
+      <p:bgPr>
+        <a:solidFill>
+          <a:schemeClr val="bg1">
+            <a:alpha val="0"/>
+          </a:schemeClr>
+        </a:solidFill>
+        <a:effectLst/>
+      </p:bgPr>
+    </p:bg>
     <p:spTree>
       <p:nvGrpSpPr>
         <p:cNvPr id="1" name="">
@@ -7729,8 +7868,18 @@
 </file>
 
 <file path=ppt/slides/slide3.xml><?xml version="1.0" encoding="utf-8"?>
-<p:sld xmlns:a="http://schemas.openxmlformats.org/drawingml/2006/main" xmlns:r="http://schemas.openxmlformats.org/officeDocument/2006/relationships" xmlns:p="http://schemas.openxmlformats.org/presentationml/2006/main">
+<p:sld xmlns:a="http://schemas.openxmlformats.org/drawingml/2006/main" xmlns:r="http://schemas.openxmlformats.org/officeDocument/2006/relationships" xmlns:p="http://schemas.openxmlformats.org/presentationml/2006/main" showMasterSp="0">
   <p:cSld>
+    <p:bg>
+      <p:bgPr>
+        <a:solidFill>
+          <a:schemeClr val="bg1">
+            <a:alpha val="0"/>
+          </a:schemeClr>
+        </a:solidFill>
+        <a:effectLst/>
+      </p:bgPr>
+    </p:bg>
     <p:spTree>
       <p:nvGrpSpPr>
         <p:cNvPr id="1" name="">
@@ -8893,8 +9042,18 @@
 </file>
 
 <file path=ppt/slides/slide5.xml><?xml version="1.0" encoding="utf-8"?>
-<p:sld xmlns:a="http://schemas.openxmlformats.org/drawingml/2006/main" xmlns:r="http://schemas.openxmlformats.org/officeDocument/2006/relationships" xmlns:p="http://schemas.openxmlformats.org/presentationml/2006/main">
+<p:sld xmlns:a="http://schemas.openxmlformats.org/drawingml/2006/main" xmlns:r="http://schemas.openxmlformats.org/officeDocument/2006/relationships" xmlns:p="http://schemas.openxmlformats.org/presentationml/2006/main" showMasterSp="0">
   <p:cSld>
+    <p:bg>
+      <p:bgPr>
+        <a:solidFill>
+          <a:schemeClr val="bg1">
+            <a:alpha val="0"/>
+          </a:schemeClr>
+        </a:solidFill>
+        <a:effectLst/>
+      </p:bgPr>
+    </p:bg>
     <p:spTree>
       <p:nvGrpSpPr>
         <p:cNvPr id="1" name="">
@@ -9071,8 +9230,18 @@
 </file>
 
 <file path=ppt/slides/slide6.xml><?xml version="1.0" encoding="utf-8"?>
-<p:sld xmlns:a="http://schemas.openxmlformats.org/drawingml/2006/main" xmlns:r="http://schemas.openxmlformats.org/officeDocument/2006/relationships" xmlns:p="http://schemas.openxmlformats.org/presentationml/2006/main">
+<p:sld xmlns:a="http://schemas.openxmlformats.org/drawingml/2006/main" xmlns:r="http://schemas.openxmlformats.org/officeDocument/2006/relationships" xmlns:p="http://schemas.openxmlformats.org/presentationml/2006/main" showMasterSp="0">
   <p:cSld>
+    <p:bg>
+      <p:bgPr>
+        <a:solidFill>
+          <a:schemeClr val="bg1">
+            <a:alpha val="0"/>
+          </a:schemeClr>
+        </a:solidFill>
+        <a:effectLst/>
+      </p:bgPr>
+    </p:bg>
     <p:spTree>
       <p:nvGrpSpPr>
         <p:cNvPr id="1" name="">
@@ -9249,8 +9418,18 @@
 </file>
 
 <file path=ppt/slides/slide7.xml><?xml version="1.0" encoding="utf-8"?>
-<p:sld xmlns:a="http://schemas.openxmlformats.org/drawingml/2006/main" xmlns:r="http://schemas.openxmlformats.org/officeDocument/2006/relationships" xmlns:p="http://schemas.openxmlformats.org/presentationml/2006/main">
+<p:sld xmlns:a="http://schemas.openxmlformats.org/drawingml/2006/main" xmlns:r="http://schemas.openxmlformats.org/officeDocument/2006/relationships" xmlns:p="http://schemas.openxmlformats.org/presentationml/2006/main" showMasterSp="0">
   <p:cSld>
+    <p:bg>
+      <p:bgPr>
+        <a:solidFill>
+          <a:schemeClr val="bg1">
+            <a:alpha val="0"/>
+          </a:schemeClr>
+        </a:solidFill>
+        <a:effectLst/>
+      </p:bgPr>
+    </p:bg>
     <p:spTree>
       <p:nvGrpSpPr>
         <p:cNvPr id="1" name="">
@@ -9427,8 +9606,18 @@
 </file>
 
 <file path=ppt/slides/slide8.xml><?xml version="1.0" encoding="utf-8"?>
-<p:sld xmlns:a="http://schemas.openxmlformats.org/drawingml/2006/main" xmlns:r="http://schemas.openxmlformats.org/officeDocument/2006/relationships" xmlns:p="http://schemas.openxmlformats.org/presentationml/2006/main">
+<p:sld xmlns:a="http://schemas.openxmlformats.org/drawingml/2006/main" xmlns:r="http://schemas.openxmlformats.org/officeDocument/2006/relationships" xmlns:p="http://schemas.openxmlformats.org/presentationml/2006/main" showMasterSp="0">
   <p:cSld>
+    <p:bg>
+      <p:bgPr>
+        <a:solidFill>
+          <a:schemeClr val="bg1">
+            <a:alpha val="0"/>
+          </a:schemeClr>
+        </a:solidFill>
+        <a:effectLst/>
+      </p:bgPr>
+    </p:bg>
     <p:spTree>
       <p:nvGrpSpPr>
         <p:cNvPr id="1" name="">
@@ -9605,8 +9794,18 @@
 </file>
 
 <file path=ppt/slides/slide9.xml><?xml version="1.0" encoding="utf-8"?>
-<p:sld xmlns:a="http://schemas.openxmlformats.org/drawingml/2006/main" xmlns:r="http://schemas.openxmlformats.org/officeDocument/2006/relationships" xmlns:p="http://schemas.openxmlformats.org/presentationml/2006/main">
+<p:sld xmlns:a="http://schemas.openxmlformats.org/drawingml/2006/main" xmlns:r="http://schemas.openxmlformats.org/officeDocument/2006/relationships" xmlns:p="http://schemas.openxmlformats.org/presentationml/2006/main" showMasterSp="0">
   <p:cSld>
+    <p:bg>
+      <p:bgPr>
+        <a:solidFill>
+          <a:schemeClr val="bg1">
+            <a:alpha val="0"/>
+          </a:schemeClr>
+        </a:solidFill>
+        <a:effectLst/>
+      </p:bgPr>
+    </p:bg>
     <p:spTree>
       <p:nvGrpSpPr>
         <p:cNvPr id="1" name="">

</xml_diff>